<commit_message>
final changes for NYPSUG presentation
</commit_message>
<xml_diff>
--- a/2021-10 NYPSUG SecretMgmt Demo/Getting Started w Microsoft Secrets Mgmt Module.pptx
+++ b/2021-10 NYPSUG SecretMgmt Demo/Getting Started w Microsoft Secrets Mgmt Module.pptx
@@ -262,7 +262,7 @@
           <a:p>
             <a:fld id="{D21E4C47-3918-4504-806B-16C4F2479A12}" type="datetimeFigureOut">
               <a:rPr lang="en-US" smtClean="0"/>
-              <a:t>2/23/2021</a:t>
+              <a:t>10/13/2021</a:t>
             </a:fld>
             <a:endParaRPr lang="en-US"/>
           </a:p>
@@ -460,7 +460,7 @@
           <a:p>
             <a:fld id="{D21E4C47-3918-4504-806B-16C4F2479A12}" type="datetimeFigureOut">
               <a:rPr lang="en-US" smtClean="0"/>
-              <a:t>2/23/2021</a:t>
+              <a:t>10/13/2021</a:t>
             </a:fld>
             <a:endParaRPr lang="en-US"/>
           </a:p>
@@ -668,7 +668,7 @@
           <a:p>
             <a:fld id="{D21E4C47-3918-4504-806B-16C4F2479A12}" type="datetimeFigureOut">
               <a:rPr lang="en-US" smtClean="0"/>
-              <a:t>2/23/2021</a:t>
+              <a:t>10/13/2021</a:t>
             </a:fld>
             <a:endParaRPr lang="en-US"/>
           </a:p>
@@ -866,7 +866,7 @@
           <a:p>
             <a:fld id="{D21E4C47-3918-4504-806B-16C4F2479A12}" type="datetimeFigureOut">
               <a:rPr lang="en-US" smtClean="0"/>
-              <a:t>2/23/2021</a:t>
+              <a:t>10/13/2021</a:t>
             </a:fld>
             <a:endParaRPr lang="en-US"/>
           </a:p>
@@ -1141,7 +1141,7 @@
           <a:p>
             <a:fld id="{D21E4C47-3918-4504-806B-16C4F2479A12}" type="datetimeFigureOut">
               <a:rPr lang="en-US" smtClean="0"/>
-              <a:t>2/23/2021</a:t>
+              <a:t>10/13/2021</a:t>
             </a:fld>
             <a:endParaRPr lang="en-US"/>
           </a:p>
@@ -1406,7 +1406,7 @@
           <a:p>
             <a:fld id="{D21E4C47-3918-4504-806B-16C4F2479A12}" type="datetimeFigureOut">
               <a:rPr lang="en-US" smtClean="0"/>
-              <a:t>2/23/2021</a:t>
+              <a:t>10/13/2021</a:t>
             </a:fld>
             <a:endParaRPr lang="en-US"/>
           </a:p>
@@ -1818,7 +1818,7 @@
           <a:p>
             <a:fld id="{D21E4C47-3918-4504-806B-16C4F2479A12}" type="datetimeFigureOut">
               <a:rPr lang="en-US" smtClean="0"/>
-              <a:t>2/23/2021</a:t>
+              <a:t>10/13/2021</a:t>
             </a:fld>
             <a:endParaRPr lang="en-US"/>
           </a:p>
@@ -1959,7 +1959,7 @@
           <a:p>
             <a:fld id="{D21E4C47-3918-4504-806B-16C4F2479A12}" type="datetimeFigureOut">
               <a:rPr lang="en-US" smtClean="0"/>
-              <a:t>2/23/2021</a:t>
+              <a:t>10/13/2021</a:t>
             </a:fld>
             <a:endParaRPr lang="en-US"/>
           </a:p>
@@ -2072,7 +2072,7 @@
           <a:p>
             <a:fld id="{D21E4C47-3918-4504-806B-16C4F2479A12}" type="datetimeFigureOut">
               <a:rPr lang="en-US" smtClean="0"/>
-              <a:t>2/23/2021</a:t>
+              <a:t>10/13/2021</a:t>
             </a:fld>
             <a:endParaRPr lang="en-US"/>
           </a:p>
@@ -2383,7 +2383,7 @@
           <a:p>
             <a:fld id="{D21E4C47-3918-4504-806B-16C4F2479A12}" type="datetimeFigureOut">
               <a:rPr lang="en-US" smtClean="0"/>
-              <a:t>2/23/2021</a:t>
+              <a:t>10/13/2021</a:t>
             </a:fld>
             <a:endParaRPr lang="en-US"/>
           </a:p>
@@ -2671,7 +2671,7 @@
           <a:p>
             <a:fld id="{D21E4C47-3918-4504-806B-16C4F2479A12}" type="datetimeFigureOut">
               <a:rPr lang="en-US" smtClean="0"/>
-              <a:t>2/23/2021</a:t>
+              <a:t>10/13/2021</a:t>
             </a:fld>
             <a:endParaRPr lang="en-US"/>
           </a:p>
@@ -2912,7 +2912,7 @@
           <a:p>
             <a:fld id="{D21E4C47-3918-4504-806B-16C4F2479A12}" type="datetimeFigureOut">
               <a:rPr lang="en-US" smtClean="0"/>
-              <a:t>2/23/2021</a:t>
+              <a:t>10/13/2021</a:t>
             </a:fld>
             <a:endParaRPr lang="en-US"/>
           </a:p>
@@ -3483,7 +3483,7 @@
         </p:blipFill>
         <p:spPr>
           <a:xfrm>
-            <a:off x="-170" y="10"/>
+            <a:off x="8219" y="8399"/>
             <a:ext cx="8450317" cy="6857990"/>
           </a:xfrm>
           <a:prstGeom prst="rect">
@@ -18077,78 +18077,6 @@
           </p:txBody>
         </p:sp>
       </p:grpSp>
-      <p:pic>
-        <p:nvPicPr>
-          <p:cNvPr id="6" name="Picture 5" descr="A blue sign with white text&#10;&#10;Description automatically generated with medium confidence">
-            <a:extLst>
-              <a:ext uri="{FF2B5EF4-FFF2-40B4-BE49-F238E27FC236}">
-                <a16:creationId xmlns:a16="http://schemas.microsoft.com/office/drawing/2014/main" id="{3496C06B-A670-494C-8525-15991D14AD3C}"/>
-              </a:ext>
-            </a:extLst>
-          </p:cNvPr>
-          <p:cNvPicPr>
-            <a:picLocks noChangeAspect="1"/>
-          </p:cNvPicPr>
-          <p:nvPr/>
-        </p:nvPicPr>
-        <p:blipFill>
-          <a:blip r:embed="rId3">
-            <a:extLst>
-              <a:ext uri="{28A0092B-C50C-407E-A947-70E740481C1C}">
-                <a14:useLocalDpi xmlns:a14="http://schemas.microsoft.com/office/drawing/2010/main" val="0"/>
-              </a:ext>
-            </a:extLst>
-          </a:blip>
-          <a:stretch>
-            <a:fillRect/>
-          </a:stretch>
-        </p:blipFill>
-        <p:spPr>
-          <a:xfrm>
-            <a:off x="8942470" y="928605"/>
-            <a:ext cx="2798114" cy="1126241"/>
-          </a:xfrm>
-          <a:prstGeom prst="rect">
-            <a:avLst/>
-          </a:prstGeom>
-        </p:spPr>
-      </p:pic>
-      <p:pic>
-        <p:nvPicPr>
-          <p:cNvPr id="11" name="Picture 10" descr="Icon&#10;&#10;Description automatically generated">
-            <a:extLst>
-              <a:ext uri="{FF2B5EF4-FFF2-40B4-BE49-F238E27FC236}">
-                <a16:creationId xmlns:a16="http://schemas.microsoft.com/office/drawing/2014/main" id="{4577D28C-AC9F-4B2C-9B4F-87C134DF2A5E}"/>
-              </a:ext>
-            </a:extLst>
-          </p:cNvPr>
-          <p:cNvPicPr>
-            <a:picLocks noChangeAspect="1"/>
-          </p:cNvPicPr>
-          <p:nvPr/>
-        </p:nvPicPr>
-        <p:blipFill>
-          <a:blip r:embed="rId4">
-            <a:extLst>
-              <a:ext uri="{28A0092B-C50C-407E-A947-70E740481C1C}">
-                <a14:useLocalDpi xmlns:a14="http://schemas.microsoft.com/office/drawing/2010/main" val="0"/>
-              </a:ext>
-            </a:extLst>
-          </a:blip>
-          <a:stretch>
-            <a:fillRect/>
-          </a:stretch>
-        </p:blipFill>
-        <p:spPr>
-          <a:xfrm>
-            <a:off x="6173507" y="3576968"/>
-            <a:ext cx="1980000" cy="1122267"/>
-          </a:xfrm>
-          <a:prstGeom prst="rect">
-            <a:avLst/>
-          </a:prstGeom>
-        </p:spPr>
-      </p:pic>
       <p:grpSp>
         <p:nvGrpSpPr>
           <p:cNvPr id="89" name="Group 88">
@@ -20815,7 +20743,7 @@
           <p:nvPr/>
         </p:nvPicPr>
         <p:blipFill>
-          <a:blip r:embed="rId5">
+          <a:blip r:embed="rId3">
             <a:extLst>
               <a:ext uri="{28A0092B-C50C-407E-A947-70E740481C1C}">
                 <a14:useLocalDpi xmlns:a14="http://schemas.microsoft.com/office/drawing/2010/main" val="0"/>
@@ -20828,8 +20756,8 @@
         </p:blipFill>
         <p:spPr bwMode="auto">
           <a:xfrm>
-            <a:off x="9254451" y="5385563"/>
-            <a:ext cx="2775749" cy="700876"/>
+            <a:off x="8412680" y="1028580"/>
+            <a:ext cx="3699025" cy="934003"/>
           </a:xfrm>
           <a:prstGeom prst="rect">
             <a:avLst/>
@@ -20860,8 +20788,8 @@
         </p:nvSpPr>
         <p:spPr>
           <a:xfrm>
-            <a:off x="469783" y="3429000"/>
-            <a:ext cx="5039265" cy="1751249"/>
+            <a:off x="469440" y="2946055"/>
+            <a:ext cx="5039265" cy="2499146"/>
           </a:xfrm>
           <a:prstGeom prst="rect">
             <a:avLst/>
@@ -20887,6 +20815,33 @@
               <a:buClrTx/>
               <a:buSzPts val="2400"/>
             </a:pPr>
+            <a:r>
+              <a:rPr lang="en-US" sz="1800" b="1" dirty="0">
+                <a:effectLst/>
+              </a:rPr>
+              <a:t>Employer:	</a:t>
+            </a:r>
+            <a:r>
+              <a:rPr lang="en-US" sz="1800" b="1" dirty="0" err="1">
+                <a:effectLst/>
+              </a:rPr>
+              <a:t>invisalign</a:t>
+            </a:r>
+            <a:br>
+              <a:rPr lang="en-US" sz="1800" b="1" dirty="0">
+                <a:effectLst/>
+              </a:rPr>
+            </a:br>
+            <a:br>
+              <a:rPr lang="en-US" sz="1800" b="1" dirty="0">
+                <a:effectLst/>
+              </a:rPr>
+            </a:br>
+            <a:br>
+              <a:rPr lang="en-US" sz="1800" b="1" dirty="0">
+                <a:effectLst/>
+              </a:rPr>
+            </a:br>
             <a:r>
               <a:rPr lang="en-US" sz="1800" b="1" dirty="0">
                 <a:effectLst/>
@@ -20965,6 +20920,78 @@
           </a:p>
         </p:txBody>
       </p:sp>
+      <p:pic>
+        <p:nvPicPr>
+          <p:cNvPr id="6" name="Picture 5" descr="A blue sign with white text&#10;&#10;Description automatically generated with medium confidence">
+            <a:extLst>
+              <a:ext uri="{FF2B5EF4-FFF2-40B4-BE49-F238E27FC236}">
+                <a16:creationId xmlns:a16="http://schemas.microsoft.com/office/drawing/2014/main" id="{3496C06B-A670-494C-8525-15991D14AD3C}"/>
+              </a:ext>
+            </a:extLst>
+          </p:cNvPr>
+          <p:cNvPicPr>
+            <a:picLocks noChangeAspect="1"/>
+          </p:cNvPicPr>
+          <p:nvPr/>
+        </p:nvPicPr>
+        <p:blipFill>
+          <a:blip r:embed="rId4">
+            <a:extLst>
+              <a:ext uri="{28A0092B-C50C-407E-A947-70E740481C1C}">
+                <a14:useLocalDpi xmlns:a14="http://schemas.microsoft.com/office/drawing/2010/main" val="0"/>
+              </a:ext>
+            </a:extLst>
+          </a:blip>
+          <a:stretch>
+            <a:fillRect/>
+          </a:stretch>
+        </p:blipFill>
+        <p:spPr>
+          <a:xfrm>
+            <a:off x="6354484" y="3704819"/>
+            <a:ext cx="2058196" cy="828424"/>
+          </a:xfrm>
+          <a:prstGeom prst="rect">
+            <a:avLst/>
+          </a:prstGeom>
+        </p:spPr>
+      </p:pic>
+      <p:pic>
+        <p:nvPicPr>
+          <p:cNvPr id="11" name="Picture 10" descr="Icon&#10;&#10;Description automatically generated">
+            <a:extLst>
+              <a:ext uri="{FF2B5EF4-FFF2-40B4-BE49-F238E27FC236}">
+                <a16:creationId xmlns:a16="http://schemas.microsoft.com/office/drawing/2014/main" id="{4577D28C-AC9F-4B2C-9B4F-87C134DF2A5E}"/>
+              </a:ext>
+            </a:extLst>
+          </p:cNvPr>
+          <p:cNvPicPr>
+            <a:picLocks noChangeAspect="1"/>
+          </p:cNvPicPr>
+          <p:nvPr/>
+        </p:nvPicPr>
+        <p:blipFill>
+          <a:blip r:embed="rId5">
+            <a:extLst>
+              <a:ext uri="{28A0092B-C50C-407E-A947-70E740481C1C}">
+                <a14:useLocalDpi xmlns:a14="http://schemas.microsoft.com/office/drawing/2010/main" val="0"/>
+              </a:ext>
+            </a:extLst>
+          </a:blip>
+          <a:stretch>
+            <a:fillRect/>
+          </a:stretch>
+        </p:blipFill>
+        <p:spPr>
+          <a:xfrm>
+            <a:off x="9309366" y="4947038"/>
+            <a:ext cx="2440071" cy="1383036"/>
+          </a:xfrm>
+          <a:prstGeom prst="rect">
+            <a:avLst/>
+          </a:prstGeom>
+        </p:spPr>
+      </p:pic>
     </p:spTree>
     <p:extLst>
       <p:ext uri="{BB962C8B-B14F-4D97-AF65-F5344CB8AC3E}">
@@ -21061,8 +21088,8 @@
         </p:nvSpPr>
         <p:spPr>
           <a:xfrm>
-            <a:off x="443564" y="2249137"/>
-            <a:ext cx="7372149" cy="3583773"/>
+            <a:off x="443564" y="1518407"/>
+            <a:ext cx="7372149" cy="4597167"/>
           </a:xfrm>
         </p:spPr>
         <p:txBody>
@@ -21083,20 +21110,23 @@
           <a:p>
             <a:pPr lvl="1"/>
             <a:r>
-              <a:rPr lang="en-US" sz="2000" b="1" dirty="0" err="1">
+              <a:rPr lang="en-US" sz="2000" b="1" dirty="0">
                 <a:solidFill>
                   <a:srgbClr val="080808"/>
                 </a:solidFill>
               </a:rPr>
-              <a:t>SecretStore</a:t>
+              <a:t>What is it?</a:t>
             </a:r>
+          </a:p>
+          <a:p>
+            <a:pPr lvl="1"/>
             <a:r>
               <a:rPr lang="en-US" sz="2000" b="1" dirty="0">
                 <a:solidFill>
                   <a:srgbClr val="080808"/>
                 </a:solidFill>
               </a:rPr>
-              <a:t> Vault</a:t>
+              <a:t>Partner modules</a:t>
             </a:r>
           </a:p>
           <a:p>
@@ -21141,28 +21171,66 @@
                   <a:srgbClr val="080808"/>
                 </a:solidFill>
               </a:rPr>
-              <a:t>Install, Config &amp; Use</a:t>
+              <a:t>Install &amp; Config</a:t>
             </a:r>
-            <a:endParaRPr lang="en-US" sz="2400" b="1" dirty="0">
+          </a:p>
+          <a:p>
+            <a:pPr lvl="1"/>
+            <a:r>
+              <a:rPr lang="en-US" sz="2000" b="1" dirty="0">
+                <a:solidFill>
+                  <a:srgbClr val="080808"/>
+                </a:solidFill>
+              </a:rPr>
+              <a:t>General Use</a:t>
+            </a:r>
+          </a:p>
+          <a:p>
+            <a:pPr lvl="1"/>
+            <a:endParaRPr lang="en-US" sz="2000" b="1" dirty="0">
               <a:solidFill>
                 <a:srgbClr val="080808"/>
               </a:solidFill>
             </a:endParaRPr>
           </a:p>
           <a:p>
-            <a:endParaRPr lang="en-US" sz="2400" b="1" dirty="0"/>
+            <a:r>
+              <a:rPr lang="en-US" b="1" dirty="0">
+                <a:solidFill>
+                  <a:srgbClr val="080808"/>
+                </a:solidFill>
+              </a:rPr>
+              <a:t>Azure </a:t>
+            </a:r>
+            <a:r>
+              <a:rPr lang="en-US" b="1" dirty="0" err="1">
+                <a:solidFill>
+                  <a:srgbClr val="080808"/>
+                </a:solidFill>
+              </a:rPr>
+              <a:t>KeyVault</a:t>
+            </a:r>
+            <a:r>
+              <a:rPr lang="en-US" b="1" dirty="0">
+                <a:solidFill>
+                  <a:srgbClr val="080808"/>
+                </a:solidFill>
+              </a:rPr>
+              <a:t> </a:t>
+            </a:r>
           </a:p>
           <a:p>
+            <a:pPr lvl="1"/>
             <a:r>
-              <a:rPr lang="en-US" sz="2400" b="1" dirty="0"/>
-              <a:t>Notes: </a:t>
+              <a:rPr lang="en-US" sz="2000" b="1" dirty="0">
+                <a:solidFill>
+                  <a:srgbClr val="080808"/>
+                </a:solidFill>
+              </a:rPr>
+              <a:t>Basic overview</a:t>
             </a:r>
-            <a:r>
-              <a:rPr lang="en-US" sz="2400" b="1" dirty="0">
-                <a:hlinkClick r:id="rId2"/>
-              </a:rPr>
-              <a:t>http://bit.ly/frpsug-mkdemo</a:t>
-            </a:r>
+          </a:p>
+          <a:p>
             <a:endParaRPr lang="en-US" sz="2400" b="1" dirty="0"/>
           </a:p>
           <a:p>
@@ -21185,7 +21253,7 @@
           <p:nvPr/>
         </p:nvPicPr>
         <p:blipFill rotWithShape="1">
-          <a:blip r:embed="rId3">
+          <a:blip r:embed="rId2">
             <a:extLst>
               <a:ext uri="{28A0092B-C50C-407E-A947-70E740481C1C}">
                 <a14:useLocalDpi xmlns:a14="http://schemas.microsoft.com/office/drawing/2010/main" val="0"/>
@@ -21701,6 +21769,58 @@
       </p:grpSpPr>
       <p:sp>
         <p:nvSpPr>
+          <p:cNvPr id="3" name="Cloud 2">
+            <a:extLst>
+              <a:ext uri="{FF2B5EF4-FFF2-40B4-BE49-F238E27FC236}">
+                <a16:creationId xmlns:a16="http://schemas.microsoft.com/office/drawing/2014/main" id="{16476A56-E1ED-4529-8FD2-50306977026B}"/>
+              </a:ext>
+            </a:extLst>
+          </p:cNvPr>
+          <p:cNvSpPr/>
+          <p:nvPr/>
+        </p:nvSpPr>
+        <p:spPr>
+          <a:xfrm flipV="1">
+            <a:off x="7013154" y="4389649"/>
+            <a:ext cx="5007974" cy="2304706"/>
+          </a:xfrm>
+          <a:prstGeom prst="cloud">
+            <a:avLst/>
+          </a:prstGeom>
+          <a:solidFill>
+            <a:schemeClr val="accent6">
+              <a:lumMod val="20000"/>
+              <a:lumOff val="80000"/>
+            </a:schemeClr>
+          </a:solidFill>
+        </p:spPr>
+        <p:style>
+          <a:lnRef idx="2">
+            <a:schemeClr val="accent1">
+              <a:shade val="50000"/>
+            </a:schemeClr>
+          </a:lnRef>
+          <a:fillRef idx="1">
+            <a:schemeClr val="accent1"/>
+          </a:fillRef>
+          <a:effectRef idx="0">
+            <a:schemeClr val="accent1"/>
+          </a:effectRef>
+          <a:fontRef idx="minor">
+            <a:schemeClr val="lt1"/>
+          </a:fontRef>
+        </p:style>
+        <p:txBody>
+          <a:bodyPr rtlCol="0" anchor="ctr"/>
+          <a:lstStyle/>
+          <a:p>
+            <a:pPr algn="ctr"/>
+            <a:endParaRPr lang="en-US"/>
+          </a:p>
+        </p:txBody>
+      </p:sp>
+      <p:sp>
+        <p:nvSpPr>
           <p:cNvPr id="2" name="Title 1">
             <a:extLst>
               <a:ext uri="{FF2B5EF4-FFF2-40B4-BE49-F238E27FC236}">
@@ -21715,7 +21835,12 @@
             <p:ph type="title"/>
           </p:nvPr>
         </p:nvSpPr>
-        <p:spPr/>
+        <p:spPr>
+          <a:xfrm>
+            <a:off x="230556" y="110343"/>
+            <a:ext cx="8247077" cy="1325563"/>
+          </a:xfrm>
+        </p:spPr>
         <p:txBody>
           <a:bodyPr/>
           <a:lstStyle/>
@@ -21727,7 +21852,7 @@
                 </a:solidFill>
                 <a:latin typeface="+mn-lt"/>
               </a:rPr>
-              <a:t>How Secrets </a:t>
+              <a:t>How </a:t>
             </a:r>
             <a:r>
               <a:rPr lang="en-US" b="1" dirty="0" err="1">
@@ -21736,7 +21861,7 @@
                 </a:solidFill>
                 <a:latin typeface="+mn-lt"/>
               </a:rPr>
-              <a:t>Mgmt</a:t>
+              <a:t>SecretMgmt</a:t>
             </a:r>
             <a:r>
               <a:rPr lang="en-US" b="1" dirty="0">
@@ -21745,7 +21870,7 @@
                 </a:solidFill>
                 <a:latin typeface="+mn-lt"/>
               </a:rPr>
-              <a:t> Works</a:t>
+              <a:t> module works</a:t>
             </a:r>
           </a:p>
         </p:txBody>
@@ -22254,8 +22379,8 @@
         </p:nvSpPr>
         <p:spPr>
           <a:xfrm>
-            <a:off x="7561998" y="5243328"/>
-            <a:ext cx="915635" cy="646331"/>
+            <a:off x="7407950" y="5243328"/>
+            <a:ext cx="1223733" cy="646331"/>
           </a:xfrm>
           <a:prstGeom prst="rect">
             <a:avLst/>
@@ -22271,7 +22396,7 @@
             <a:pPr algn="ctr"/>
             <a:r>
               <a:rPr lang="en-US" dirty="0" err="1"/>
-              <a:t>KeyPass</a:t>
+              <a:t>AZKeyvault</a:t>
             </a:r>
             <a:br>
               <a:rPr lang="en-US" dirty="0"/>

</xml_diff>

<commit_message>
last minute fix for notes file and PPTX
</commit_message>
<xml_diff>
--- a/2021-10 NYPSUG SecretMgmt Demo/Getting Started w Microsoft Secrets Mgmt Module.pptx
+++ b/2021-10 NYPSUG SecretMgmt Demo/Getting Started w Microsoft Secrets Mgmt Module.pptx
@@ -262,7 +262,7 @@
           <a:p>
             <a:fld id="{D21E4C47-3918-4504-806B-16C4F2479A12}" type="datetimeFigureOut">
               <a:rPr lang="en-US" smtClean="0"/>
-              <a:t>10/13/2021</a:t>
+              <a:t>10/14/2021</a:t>
             </a:fld>
             <a:endParaRPr lang="en-US"/>
           </a:p>
@@ -460,7 +460,7 @@
           <a:p>
             <a:fld id="{D21E4C47-3918-4504-806B-16C4F2479A12}" type="datetimeFigureOut">
               <a:rPr lang="en-US" smtClean="0"/>
-              <a:t>10/13/2021</a:t>
+              <a:t>10/14/2021</a:t>
             </a:fld>
             <a:endParaRPr lang="en-US"/>
           </a:p>
@@ -668,7 +668,7 @@
           <a:p>
             <a:fld id="{D21E4C47-3918-4504-806B-16C4F2479A12}" type="datetimeFigureOut">
               <a:rPr lang="en-US" smtClean="0"/>
-              <a:t>10/13/2021</a:t>
+              <a:t>10/14/2021</a:t>
             </a:fld>
             <a:endParaRPr lang="en-US"/>
           </a:p>
@@ -866,7 +866,7 @@
           <a:p>
             <a:fld id="{D21E4C47-3918-4504-806B-16C4F2479A12}" type="datetimeFigureOut">
               <a:rPr lang="en-US" smtClean="0"/>
-              <a:t>10/13/2021</a:t>
+              <a:t>10/14/2021</a:t>
             </a:fld>
             <a:endParaRPr lang="en-US"/>
           </a:p>
@@ -1141,7 +1141,7 @@
           <a:p>
             <a:fld id="{D21E4C47-3918-4504-806B-16C4F2479A12}" type="datetimeFigureOut">
               <a:rPr lang="en-US" smtClean="0"/>
-              <a:t>10/13/2021</a:t>
+              <a:t>10/14/2021</a:t>
             </a:fld>
             <a:endParaRPr lang="en-US"/>
           </a:p>
@@ -1406,7 +1406,7 @@
           <a:p>
             <a:fld id="{D21E4C47-3918-4504-806B-16C4F2479A12}" type="datetimeFigureOut">
               <a:rPr lang="en-US" smtClean="0"/>
-              <a:t>10/13/2021</a:t>
+              <a:t>10/14/2021</a:t>
             </a:fld>
             <a:endParaRPr lang="en-US"/>
           </a:p>
@@ -1818,7 +1818,7 @@
           <a:p>
             <a:fld id="{D21E4C47-3918-4504-806B-16C4F2479A12}" type="datetimeFigureOut">
               <a:rPr lang="en-US" smtClean="0"/>
-              <a:t>10/13/2021</a:t>
+              <a:t>10/14/2021</a:t>
             </a:fld>
             <a:endParaRPr lang="en-US"/>
           </a:p>
@@ -1959,7 +1959,7 @@
           <a:p>
             <a:fld id="{D21E4C47-3918-4504-806B-16C4F2479A12}" type="datetimeFigureOut">
               <a:rPr lang="en-US" smtClean="0"/>
-              <a:t>10/13/2021</a:t>
+              <a:t>10/14/2021</a:t>
             </a:fld>
             <a:endParaRPr lang="en-US"/>
           </a:p>
@@ -2072,7 +2072,7 @@
           <a:p>
             <a:fld id="{D21E4C47-3918-4504-806B-16C4F2479A12}" type="datetimeFigureOut">
               <a:rPr lang="en-US" smtClean="0"/>
-              <a:t>10/13/2021</a:t>
+              <a:t>10/14/2021</a:t>
             </a:fld>
             <a:endParaRPr lang="en-US"/>
           </a:p>
@@ -2383,7 +2383,7 @@
           <a:p>
             <a:fld id="{D21E4C47-3918-4504-806B-16C4F2479A12}" type="datetimeFigureOut">
               <a:rPr lang="en-US" smtClean="0"/>
-              <a:t>10/13/2021</a:t>
+              <a:t>10/14/2021</a:t>
             </a:fld>
             <a:endParaRPr lang="en-US"/>
           </a:p>
@@ -2671,7 +2671,7 @@
           <a:p>
             <a:fld id="{D21E4C47-3918-4504-806B-16C4F2479A12}" type="datetimeFigureOut">
               <a:rPr lang="en-US" smtClean="0"/>
-              <a:t>10/13/2021</a:t>
+              <a:t>10/14/2021</a:t>
             </a:fld>
             <a:endParaRPr lang="en-US"/>
           </a:p>
@@ -2912,7 +2912,7 @@
           <a:p>
             <a:fld id="{D21E4C47-3918-4504-806B-16C4F2479A12}" type="datetimeFigureOut">
               <a:rPr lang="en-US" smtClean="0"/>
-              <a:t>10/13/2021</a:t>
+              <a:t>10/14/2021</a:t>
             </a:fld>
             <a:endParaRPr lang="en-US"/>
           </a:p>
@@ -21048,8 +21048,8 @@
         </p:nvSpPr>
         <p:spPr>
           <a:xfrm>
-            <a:off x="443564" y="362308"/>
-            <a:ext cx="6091990" cy="1325563"/>
+            <a:off x="443564" y="204688"/>
+            <a:ext cx="6091990" cy="1075475"/>
           </a:xfrm>
         </p:spPr>
         <p:txBody>
@@ -21088,13 +21088,13 @@
         </p:nvSpPr>
         <p:spPr>
           <a:xfrm>
-            <a:off x="443564" y="1518407"/>
-            <a:ext cx="7372149" cy="4597167"/>
+            <a:off x="443564" y="1090569"/>
+            <a:ext cx="7372149" cy="5025005"/>
           </a:xfrm>
         </p:spPr>
         <p:txBody>
           <a:bodyPr>
-            <a:normAutofit/>
+            <a:normAutofit lnSpcReduction="10000"/>
           </a:bodyPr>
           <a:lstStyle/>
           <a:p>
@@ -21234,6 +21234,23 @@
             <a:endParaRPr lang="en-US" sz="2400" b="1" dirty="0"/>
           </a:p>
           <a:p>
+            <a:r>
+              <a:rPr lang="en-US" b="1" dirty="0"/>
+              <a:t>Link to files:</a:t>
+            </a:r>
+            <a:r>
+              <a:rPr lang="en-US" sz="2400" b="1" dirty="0"/>
+              <a:t> </a:t>
+            </a:r>
+            <a:r>
+              <a:rPr lang="en-US" sz="2400" b="1" dirty="0">
+                <a:hlinkClick r:id="rId2"/>
+              </a:rPr>
+              <a:t>https://github.com/compwiz32/Presentations</a:t>
+            </a:r>
+            <a:endParaRPr lang="en-US" sz="2400" b="1" dirty="0"/>
+          </a:p>
+          <a:p>
             <a:endParaRPr lang="en-US" sz="2400" b="1" dirty="0"/>
           </a:p>
         </p:txBody>
@@ -21253,7 +21270,7 @@
           <p:nvPr/>
         </p:nvPicPr>
         <p:blipFill rotWithShape="1">
-          <a:blip r:embed="rId2">
+          <a:blip r:embed="rId3">
             <a:extLst>
               <a:ext uri="{28A0092B-C50C-407E-A947-70E740481C1C}">
                 <a14:useLocalDpi xmlns:a14="http://schemas.microsoft.com/office/drawing/2010/main" val="0"/>

</xml_diff>

<commit_message>
File for SoCal PSUG Demo
</commit_message>
<xml_diff>
--- a/2021-10 NYPSUG SecretMgmt Demo/Getting Started w Microsoft Secrets Mgmt Module.pptx
+++ b/2021-10 NYPSUG SecretMgmt Demo/Getting Started w Microsoft Secrets Mgmt Module.pptx
@@ -20756,8 +20756,8 @@
         </p:blipFill>
         <p:spPr bwMode="auto">
           <a:xfrm>
-            <a:off x="8412680" y="1028580"/>
-            <a:ext cx="3699025" cy="934003"/>
+            <a:off x="6137676" y="3813446"/>
+            <a:ext cx="2608011" cy="658522"/>
           </a:xfrm>
           <a:prstGeom prst="rect">
             <a:avLst/>
@@ -20948,8 +20948,8 @@
         </p:blipFill>
         <p:spPr>
           <a:xfrm>
-            <a:off x="6354484" y="3704819"/>
-            <a:ext cx="2058196" cy="828424"/>
+            <a:off x="9261475" y="894506"/>
+            <a:ext cx="2487962" cy="1001405"/>
           </a:xfrm>
           <a:prstGeom prst="rect">
             <a:avLst/>

</xml_diff>